<commit_message>
Reselect benchmark and explore optimize strategy.
</commit_message>
<xml_diff>
--- a/phase_02_validation/benchmark/benchmark_complex.pptx
+++ b/phase_02_validation/benchmark/benchmark_complex.pptx
@@ -200,7 +200,7 @@
           <a:p>
             <a:fld id="{6E2EFCCA-1A1E-4A7E-BD68-8F3FE974EAAE}" type="datetimeFigureOut">
               <a:rPr lang="zh-CN" altLang="en-US" smtClean="0"/>
-              <a:t>2021/4/17</a:t>
+              <a:t>2021/4/29</a:t>
             </a:fld>
             <a:endParaRPr lang="zh-CN" altLang="en-US"/>
           </a:p>
@@ -698,7 +698,7 @@
           <a:p>
             <a:fld id="{79C4984E-2152-48AE-A290-9C70F3AFD632}" type="datetimeFigureOut">
               <a:rPr lang="zh-CN" altLang="en-US" smtClean="0"/>
-              <a:t>2021/4/17</a:t>
+              <a:t>2021/4/29</a:t>
             </a:fld>
             <a:endParaRPr lang="zh-CN" altLang="en-US"/>
           </a:p>
@@ -896,7 +896,7 @@
           <a:p>
             <a:fld id="{79C4984E-2152-48AE-A290-9C70F3AFD632}" type="datetimeFigureOut">
               <a:rPr lang="zh-CN" altLang="en-US" smtClean="0"/>
-              <a:t>2021/4/17</a:t>
+              <a:t>2021/4/29</a:t>
             </a:fld>
             <a:endParaRPr lang="zh-CN" altLang="en-US"/>
           </a:p>
@@ -1104,7 +1104,7 @@
           <a:p>
             <a:fld id="{79C4984E-2152-48AE-A290-9C70F3AFD632}" type="datetimeFigureOut">
               <a:rPr lang="zh-CN" altLang="en-US" smtClean="0"/>
-              <a:t>2021/4/17</a:t>
+              <a:t>2021/4/29</a:t>
             </a:fld>
             <a:endParaRPr lang="zh-CN" altLang="en-US"/>
           </a:p>
@@ -1302,7 +1302,7 @@
           <a:p>
             <a:fld id="{79C4984E-2152-48AE-A290-9C70F3AFD632}" type="datetimeFigureOut">
               <a:rPr lang="zh-CN" altLang="en-US" smtClean="0"/>
-              <a:t>2021/4/17</a:t>
+              <a:t>2021/4/29</a:t>
             </a:fld>
             <a:endParaRPr lang="zh-CN" altLang="en-US"/>
           </a:p>
@@ -1577,7 +1577,7 @@
           <a:p>
             <a:fld id="{79C4984E-2152-48AE-A290-9C70F3AFD632}" type="datetimeFigureOut">
               <a:rPr lang="zh-CN" altLang="en-US" smtClean="0"/>
-              <a:t>2021/4/17</a:t>
+              <a:t>2021/4/29</a:t>
             </a:fld>
             <a:endParaRPr lang="zh-CN" altLang="en-US"/>
           </a:p>
@@ -1842,7 +1842,7 @@
           <a:p>
             <a:fld id="{79C4984E-2152-48AE-A290-9C70F3AFD632}" type="datetimeFigureOut">
               <a:rPr lang="zh-CN" altLang="en-US" smtClean="0"/>
-              <a:t>2021/4/17</a:t>
+              <a:t>2021/4/29</a:t>
             </a:fld>
             <a:endParaRPr lang="zh-CN" altLang="en-US"/>
           </a:p>
@@ -2254,7 +2254,7 @@
           <a:p>
             <a:fld id="{79C4984E-2152-48AE-A290-9C70F3AFD632}" type="datetimeFigureOut">
               <a:rPr lang="zh-CN" altLang="en-US" smtClean="0"/>
-              <a:t>2021/4/17</a:t>
+              <a:t>2021/4/29</a:t>
             </a:fld>
             <a:endParaRPr lang="zh-CN" altLang="en-US"/>
           </a:p>
@@ -2395,7 +2395,7 @@
           <a:p>
             <a:fld id="{79C4984E-2152-48AE-A290-9C70F3AFD632}" type="datetimeFigureOut">
               <a:rPr lang="zh-CN" altLang="en-US" smtClean="0"/>
-              <a:t>2021/4/17</a:t>
+              <a:t>2021/4/29</a:t>
             </a:fld>
             <a:endParaRPr lang="zh-CN" altLang="en-US"/>
           </a:p>
@@ -2508,7 +2508,7 @@
           <a:p>
             <a:fld id="{79C4984E-2152-48AE-A290-9C70F3AFD632}" type="datetimeFigureOut">
               <a:rPr lang="zh-CN" altLang="en-US" smtClean="0"/>
-              <a:t>2021/4/17</a:t>
+              <a:t>2021/4/29</a:t>
             </a:fld>
             <a:endParaRPr lang="zh-CN" altLang="en-US"/>
           </a:p>
@@ -2819,7 +2819,7 @@
           <a:p>
             <a:fld id="{79C4984E-2152-48AE-A290-9C70F3AFD632}" type="datetimeFigureOut">
               <a:rPr lang="zh-CN" altLang="en-US" smtClean="0"/>
-              <a:t>2021/4/17</a:t>
+              <a:t>2021/4/29</a:t>
             </a:fld>
             <a:endParaRPr lang="zh-CN" altLang="en-US"/>
           </a:p>
@@ -3107,7 +3107,7 @@
           <a:p>
             <a:fld id="{79C4984E-2152-48AE-A290-9C70F3AFD632}" type="datetimeFigureOut">
               <a:rPr lang="zh-CN" altLang="en-US" smtClean="0"/>
-              <a:t>2021/4/17</a:t>
+              <a:t>2021/4/29</a:t>
             </a:fld>
             <a:endParaRPr lang="zh-CN" altLang="en-US"/>
           </a:p>
@@ -3348,7 +3348,7 @@
           <a:p>
             <a:fld id="{79C4984E-2152-48AE-A290-9C70F3AFD632}" type="datetimeFigureOut">
               <a:rPr lang="zh-CN" altLang="en-US" smtClean="0"/>
-              <a:t>2021/4/17</a:t>
+              <a:t>2021/4/29</a:t>
             </a:fld>
             <a:endParaRPr lang="zh-CN" altLang="en-US"/>
           </a:p>
@@ -5705,7 +5705,7 @@
                 <a:latin typeface="Calibri" panose="020F0502020204030204" pitchFamily="34" charset="0"/>
                 <a:cs typeface="Calibri" panose="020F0502020204030204" pitchFamily="34" charset="0"/>
               </a:rPr>
-              <a:t>AOMK group at C terminal</a:t>
+              <a:t>AOMK group at C terminal (covalently bonds to protein)</a:t>
             </a:r>
           </a:p>
         </p:txBody>

</xml_diff>